<commit_message>
Update PYTHON_3_Algorithmic Thinking & Debugging.pptx
</commit_message>
<xml_diff>
--- a/PYTHON_3_Algorithmic Thinking & Debugging.pptx
+++ b/PYTHON_3_Algorithmic Thinking & Debugging.pptx
@@ -281,7 +281,7 @@
           <a:p>
             <a:fld id="{D3853345-A581-455E-9661-1270F4F6E587}" type="datetimeFigureOut">
               <a:rPr lang="en-US" smtClean="0"/>
-              <a:t>6/13/2019</a:t>
+              <a:t>6/25/2019</a:t>
             </a:fld>
             <a:endParaRPr lang="en-US"/>
           </a:p>
@@ -484,7 +484,7 @@
           <a:p>
             <a:fld id="{D3853345-A581-455E-9661-1270F4F6E587}" type="datetimeFigureOut">
               <a:rPr lang="en-US" smtClean="0"/>
-              <a:t>6/13/2019</a:t>
+              <a:t>6/25/2019</a:t>
             </a:fld>
             <a:endParaRPr lang="en-US"/>
           </a:p>
@@ -692,7 +692,7 @@
           <a:p>
             <a:fld id="{D3853345-A581-455E-9661-1270F4F6E587}" type="datetimeFigureOut">
               <a:rPr lang="en-US" smtClean="0"/>
-              <a:t>6/13/2019</a:t>
+              <a:t>6/25/2019</a:t>
             </a:fld>
             <a:endParaRPr lang="en-US"/>
           </a:p>
@@ -890,7 +890,7 @@
           <a:p>
             <a:fld id="{D3853345-A581-455E-9661-1270F4F6E587}" type="datetimeFigureOut">
               <a:rPr lang="en-US" smtClean="0"/>
-              <a:t>6/13/2019</a:t>
+              <a:t>6/25/2019</a:t>
             </a:fld>
             <a:endParaRPr lang="en-US"/>
           </a:p>
@@ -1165,7 +1165,7 @@
           <a:p>
             <a:fld id="{D3853345-A581-455E-9661-1270F4F6E587}" type="datetimeFigureOut">
               <a:rPr lang="en-US" smtClean="0"/>
-              <a:t>6/13/2019</a:t>
+              <a:t>6/25/2019</a:t>
             </a:fld>
             <a:endParaRPr lang="en-US"/>
           </a:p>
@@ -1430,7 +1430,7 @@
           <a:p>
             <a:fld id="{D3853345-A581-455E-9661-1270F4F6E587}" type="datetimeFigureOut">
               <a:rPr lang="en-US" smtClean="0"/>
-              <a:t>6/13/2019</a:t>
+              <a:t>6/25/2019</a:t>
             </a:fld>
             <a:endParaRPr lang="en-US"/>
           </a:p>
@@ -1842,7 +1842,7 @@
           <a:p>
             <a:fld id="{D3853345-A581-455E-9661-1270F4F6E587}" type="datetimeFigureOut">
               <a:rPr lang="en-US" smtClean="0"/>
-              <a:t>6/13/2019</a:t>
+              <a:t>6/25/2019</a:t>
             </a:fld>
             <a:endParaRPr lang="en-US"/>
           </a:p>
@@ -1983,7 +1983,7 @@
           <a:p>
             <a:fld id="{D3853345-A581-455E-9661-1270F4F6E587}" type="datetimeFigureOut">
               <a:rPr lang="en-US" smtClean="0"/>
-              <a:t>6/13/2019</a:t>
+              <a:t>6/25/2019</a:t>
             </a:fld>
             <a:endParaRPr lang="en-US"/>
           </a:p>
@@ -2096,7 +2096,7 @@
           <a:p>
             <a:fld id="{D3853345-A581-455E-9661-1270F4F6E587}" type="datetimeFigureOut">
               <a:rPr lang="en-US" smtClean="0"/>
-              <a:t>6/13/2019</a:t>
+              <a:t>6/25/2019</a:t>
             </a:fld>
             <a:endParaRPr lang="en-US"/>
           </a:p>
@@ -2412,7 +2412,7 @@
           <a:p>
             <a:fld id="{D3853345-A581-455E-9661-1270F4F6E587}" type="datetimeFigureOut">
               <a:rPr lang="en-US" smtClean="0"/>
-              <a:t>6/13/2019</a:t>
+              <a:t>6/25/2019</a:t>
             </a:fld>
             <a:endParaRPr lang="en-US"/>
           </a:p>
@@ -2705,7 +2705,7 @@
           <a:p>
             <a:fld id="{D3853345-A581-455E-9661-1270F4F6E587}" type="datetimeFigureOut">
               <a:rPr lang="en-US" smtClean="0"/>
-              <a:t>6/13/2019</a:t>
+              <a:t>6/25/2019</a:t>
             </a:fld>
             <a:endParaRPr lang="en-US"/>
           </a:p>
@@ -2946,7 +2946,7 @@
           <a:p>
             <a:fld id="{D3853345-A581-455E-9661-1270F4F6E587}" type="datetimeFigureOut">
               <a:rPr lang="en-US" smtClean="0"/>
-              <a:t>6/13/2019</a:t>
+              <a:t>6/25/2019</a:t>
             </a:fld>
             <a:endParaRPr lang="en-US"/>
           </a:p>
@@ -3794,10 +3794,9 @@
           <a:lstStyle/>
           <a:p>
             <a:r>
-              <a:rPr lang="en-US" b="1"/>
+              <a:rPr lang="en-US" b="1" dirty="0"/>
               <a:t>Step 2B: Pseudocode </a:t>
             </a:r>
-            <a:endParaRPr lang="en-US" b="1" dirty="0"/>
           </a:p>
         </p:txBody>
       </p:sp>
@@ -5260,7 +5259,37 @@
           <a:bodyPr/>
           <a:lstStyle/>
           <a:p>
+            <a:r>
+              <a:rPr lang="en-US" dirty="0"/>
+              <a:t>#This is a single line comment </a:t>
+            </a:r>
+          </a:p>
+          <a:p>
             <a:endParaRPr lang="en-US" dirty="0"/>
+          </a:p>
+          <a:p>
+            <a:r>
+              <a:rPr lang="en-US" dirty="0"/>
+              <a:t>‘’’ This is </a:t>
+            </a:r>
+          </a:p>
+          <a:p>
+            <a:pPr marL="0" indent="0">
+              <a:buNone/>
+            </a:pPr>
+            <a:r>
+              <a:rPr lang="en-US" dirty="0"/>
+              <a:t>        a multiline </a:t>
+            </a:r>
+          </a:p>
+          <a:p>
+            <a:pPr marL="0" indent="0">
+              <a:buNone/>
+            </a:pPr>
+            <a:r>
+              <a:rPr lang="en-US" dirty="0"/>
+              <a:t>        comment ’’’</a:t>
+            </a:r>
           </a:p>
         </p:txBody>
       </p:sp>
@@ -5316,34 +5345,92 @@
           <a:lstStyle/>
           <a:p>
             <a:r>
+              <a:rPr lang="en-US" b="1" dirty="0"/>
+              <a:t>HW 3</a:t>
+            </a:r>
+          </a:p>
+        </p:txBody>
+      </p:sp>
+      <p:sp>
+        <p:nvSpPr>
+          <p:cNvPr id="3" name="Content Placeholder 2">
+            <a:extLst>
+              <a:ext uri="{FF2B5EF4-FFF2-40B4-BE49-F238E27FC236}">
+                <a16:creationId xmlns:a16="http://schemas.microsoft.com/office/drawing/2014/main" id="{F0F47342-8D75-4E48-ABA6-FCA45870F395}"/>
+              </a:ext>
+            </a:extLst>
+          </p:cNvPr>
+          <p:cNvSpPr>
+            <a:spLocks noGrp="1"/>
+          </p:cNvSpPr>
+          <p:nvPr>
+            <p:ph idx="1"/>
+          </p:nvPr>
+        </p:nvSpPr>
+        <p:spPr/>
+        <p:txBody>
+          <a:bodyPr/>
+          <a:lstStyle/>
+          <a:p>
+            <a:r>
               <a:rPr lang="en-US" dirty="0"/>
-              <a:t>Some HW </a:t>
-            </a:r>
-          </a:p>
-        </p:txBody>
-      </p:sp>
-      <p:sp>
-        <p:nvSpPr>
-          <p:cNvPr id="3" name="Content Placeholder 2">
-            <a:extLst>
-              <a:ext uri="{FF2B5EF4-FFF2-40B4-BE49-F238E27FC236}">
-                <a16:creationId xmlns:a16="http://schemas.microsoft.com/office/drawing/2014/main" id="{F0F47342-8D75-4E48-ABA6-FCA45870F395}"/>
-              </a:ext>
-            </a:extLst>
-          </p:cNvPr>
-          <p:cNvSpPr>
-            <a:spLocks noGrp="1"/>
-          </p:cNvSpPr>
-          <p:nvPr>
-            <p:ph idx="1"/>
-          </p:nvPr>
-        </p:nvSpPr>
-        <p:spPr/>
-        <p:txBody>
-          <a:bodyPr/>
-          <a:lstStyle/>
-          <a:p>
-            <a:endParaRPr lang="en-US"/>
+              <a:t>Write the Pseudocode and draw a flowchart for calculating percentage. </a:t>
+            </a:r>
+          </a:p>
+          <a:p>
+            <a:r>
+              <a:rPr lang="en-US" dirty="0"/>
+              <a:t>Below is the formula for calculating the percentage </a:t>
+            </a:r>
+          </a:p>
+          <a:p>
+            <a:pPr marL="0" indent="0">
+              <a:buNone/>
+            </a:pPr>
+            <a:r>
+              <a:rPr lang="en-US" dirty="0"/>
+              <a:t>        		</a:t>
+            </a:r>
+          </a:p>
+          <a:p>
+            <a:pPr marL="0" indent="0">
+              <a:buNone/>
+            </a:pPr>
+            <a:r>
+              <a:rPr lang="en-US" dirty="0"/>
+              <a:t>	</a:t>
+            </a:r>
+            <a:r>
+              <a:rPr lang="en-US" dirty="0">
+                <a:solidFill>
+                  <a:srgbClr val="FF0000"/>
+                </a:solidFill>
+              </a:rPr>
+              <a:t>Percentage= marks obtained/ total marks * 100</a:t>
+            </a:r>
+          </a:p>
+          <a:p>
+            <a:pPr marL="0" indent="0">
+              <a:buNone/>
+            </a:pPr>
+            <a:endParaRPr lang="en-US" dirty="0">
+              <a:solidFill>
+                <a:srgbClr val="FF0000"/>
+              </a:solidFill>
+            </a:endParaRPr>
+          </a:p>
+          <a:p>
+            <a:pPr marL="0" indent="0">
+              <a:buNone/>
+            </a:pPr>
+            <a:r>
+              <a:rPr lang="en-US" dirty="0">
+                <a:solidFill>
+                  <a:srgbClr val="FF0000"/>
+                </a:solidFill>
+              </a:rPr>
+              <a:t>Do this on your notebook and submit the next day. </a:t>
+            </a:r>
           </a:p>
         </p:txBody>
       </p:sp>

</xml_diff>